<commit_message>
Add ufficial slide tamplate with session info
</commit_message>
<xml_diff>
--- a/slides/CodeGen_Template.pptx
+++ b/slides/CodeGen_Template.pptx
@@ -122,6 +122,129 @@
 </p:presentation>
 </file>
 
+<file path=ppt/changesInfos/changesInfo1.xml><?xml version="1.0" encoding="utf-8"?>
+<pc:chgInfo xmlns:a="http://schemas.openxmlformats.org/drawingml/2006/main" xmlns:r="http://schemas.openxmlformats.org/officeDocument/2006/relationships" xmlns:ac="http://schemas.microsoft.com/office/drawing/2013/main/command" xmlns:pc="http://schemas.microsoft.com/office/powerpoint/2013/main/command">
+  <pc:docChgLst>
+    <pc:chgData name="GIULIANO LATINI" userId="27e3ac559581c63f" providerId="LiveId" clId="{4973F3F1-B909-42E3-B41D-E3B1A4AEB0AD}"/>
+    <pc:docChg chg="undo modSld">
+      <pc:chgData name="GIULIANO LATINI" userId="27e3ac559581c63f" providerId="LiveId" clId="{4973F3F1-B909-42E3-B41D-E3B1A4AEB0AD}" dt="2018-09-16T19:35:40.896" v="216"/>
+      <pc:docMkLst>
+        <pc:docMk/>
+      </pc:docMkLst>
+      <pc:sldChg chg="modSp">
+        <pc:chgData name="GIULIANO LATINI" userId="27e3ac559581c63f" providerId="LiveId" clId="{4973F3F1-B909-42E3-B41D-E3B1A4AEB0AD}" dt="2018-09-16T19:34:45.060" v="214" actId="20577"/>
+        <pc:sldMkLst>
+          <pc:docMk/>
+          <pc:sldMk cId="3209317228" sldId="256"/>
+        </pc:sldMkLst>
+        <pc:spChg chg="mod">
+          <ac:chgData name="GIULIANO LATINI" userId="27e3ac559581c63f" providerId="LiveId" clId="{4973F3F1-B909-42E3-B41D-E3B1A4AEB0AD}" dt="2018-09-16T19:34:45.060" v="214" actId="20577"/>
+          <ac:spMkLst>
+            <pc:docMk/>
+            <pc:sldMk cId="3209317228" sldId="256"/>
+            <ac:spMk id="2" creationId="{BD2DF659-465F-4FDC-98F2-347BE3E9589B}"/>
+          </ac:spMkLst>
+        </pc:spChg>
+        <pc:spChg chg="mod">
+          <ac:chgData name="GIULIANO LATINI" userId="27e3ac559581c63f" providerId="LiveId" clId="{4973F3F1-B909-42E3-B41D-E3B1A4AEB0AD}" dt="2018-09-16T19:34:19.771" v="211"/>
+          <ac:spMkLst>
+            <pc:docMk/>
+            <pc:sldMk cId="3209317228" sldId="256"/>
+            <ac:spMk id="3" creationId="{4413CDE4-3094-4196-9173-F4A0D537BAD5}"/>
+          </ac:spMkLst>
+        </pc:spChg>
+      </pc:sldChg>
+      <pc:sldChg chg="modSp">
+        <pc:chgData name="GIULIANO LATINI" userId="27e3ac559581c63f" providerId="LiveId" clId="{4973F3F1-B909-42E3-B41D-E3B1A4AEB0AD}" dt="2018-09-16T19:33:16.267" v="208" actId="20577"/>
+        <pc:sldMkLst>
+          <pc:docMk/>
+          <pc:sldMk cId="3208365751" sldId="262"/>
+        </pc:sldMkLst>
+        <pc:spChg chg="mod">
+          <ac:chgData name="GIULIANO LATINI" userId="27e3ac559581c63f" providerId="LiveId" clId="{4973F3F1-B909-42E3-B41D-E3B1A4AEB0AD}" dt="2018-09-16T19:33:03.883" v="179" actId="20577"/>
+          <ac:spMkLst>
+            <pc:docMk/>
+            <pc:sldMk cId="3208365751" sldId="262"/>
+            <ac:spMk id="2" creationId="{A5DB07F4-037E-4666-BFFC-D4BC9B32ADA4}"/>
+          </ac:spMkLst>
+        </pc:spChg>
+        <pc:spChg chg="mod">
+          <ac:chgData name="GIULIANO LATINI" userId="27e3ac559581c63f" providerId="LiveId" clId="{4973F3F1-B909-42E3-B41D-E3B1A4AEB0AD}" dt="2018-09-16T19:33:11.296" v="194" actId="20577"/>
+          <ac:spMkLst>
+            <pc:docMk/>
+            <pc:sldMk cId="3208365751" sldId="262"/>
+            <ac:spMk id="3" creationId="{0FBC0E0C-D04F-4813-ACAC-967DF99282B2}"/>
+          </ac:spMkLst>
+        </pc:spChg>
+        <pc:spChg chg="mod">
+          <ac:chgData name="GIULIANO LATINI" userId="27e3ac559581c63f" providerId="LiveId" clId="{4973F3F1-B909-42E3-B41D-E3B1A4AEB0AD}" dt="2018-09-16T19:33:16.267" v="208" actId="20577"/>
+          <ac:spMkLst>
+            <pc:docMk/>
+            <pc:sldMk cId="3208365751" sldId="262"/>
+            <ac:spMk id="4" creationId="{FBEDAFD7-CF92-4199-8229-5FCED907CDA4}"/>
+          </ac:spMkLst>
+        </pc:spChg>
+      </pc:sldChg>
+      <pc:sldChg chg="addSp modSp">
+        <pc:chgData name="GIULIANO LATINI" userId="27e3ac559581c63f" providerId="LiveId" clId="{4973F3F1-B909-42E3-B41D-E3B1A4AEB0AD}" dt="2018-09-16T19:35:40.896" v="216"/>
+        <pc:sldMkLst>
+          <pc:docMk/>
+          <pc:sldMk cId="267602705" sldId="263"/>
+        </pc:sldMkLst>
+        <pc:spChg chg="mod">
+          <ac:chgData name="GIULIANO LATINI" userId="27e3ac559581c63f" providerId="LiveId" clId="{4973F3F1-B909-42E3-B41D-E3B1A4AEB0AD}" dt="2018-09-16T19:35:40.896" v="216"/>
+          <ac:spMkLst>
+            <pc:docMk/>
+            <pc:sldMk cId="267602705" sldId="263"/>
+            <ac:spMk id="5" creationId="{10801826-D1EC-495A-B39E-EB60FC876EB9}"/>
+          </ac:spMkLst>
+        </pc:spChg>
+        <pc:spChg chg="mod">
+          <ac:chgData name="GIULIANO LATINI" userId="27e3ac559581c63f" providerId="LiveId" clId="{4973F3F1-B909-42E3-B41D-E3B1A4AEB0AD}" dt="2018-09-16T19:19:43.190" v="45" actId="20577"/>
+          <ac:spMkLst>
+            <pc:docMk/>
+            <pc:sldMk cId="267602705" sldId="263"/>
+            <ac:spMk id="6" creationId="{4AD74FBB-F86F-41E2-81B5-937757080026}"/>
+          </ac:spMkLst>
+        </pc:spChg>
+        <pc:spChg chg="mod">
+          <ac:chgData name="GIULIANO LATINI" userId="27e3ac559581c63f" providerId="LiveId" clId="{4973F3F1-B909-42E3-B41D-E3B1A4AEB0AD}" dt="2018-09-16T19:19:48.686" v="59" actId="20577"/>
+          <ac:spMkLst>
+            <pc:docMk/>
+            <pc:sldMk cId="267602705" sldId="263"/>
+            <ac:spMk id="7" creationId="{5E39D7F1-ED04-48F8-B4A9-96B43565281F}"/>
+          </ac:spMkLst>
+        </pc:spChg>
+        <pc:spChg chg="mod">
+          <ac:chgData name="GIULIANO LATINI" userId="27e3ac559581c63f" providerId="LiveId" clId="{4973F3F1-B909-42E3-B41D-E3B1A4AEB0AD}" dt="2018-09-16T19:19:54.360" v="73" actId="20577"/>
+          <ac:spMkLst>
+            <pc:docMk/>
+            <pc:sldMk cId="267602705" sldId="263"/>
+            <ac:spMk id="8" creationId="{2A12E99D-348B-4644-9C1E-5EE333B378ED}"/>
+          </ac:spMkLst>
+        </pc:spChg>
+        <pc:spChg chg="mod">
+          <ac:chgData name="GIULIANO LATINI" userId="27e3ac559581c63f" providerId="LiveId" clId="{4973F3F1-B909-42E3-B41D-E3B1A4AEB0AD}" dt="2018-09-16T19:19:21.186" v="30" actId="20577"/>
+          <ac:spMkLst>
+            <pc:docMk/>
+            <pc:sldMk cId="267602705" sldId="263"/>
+            <ac:spMk id="9" creationId="{BA5039AF-CDBD-4D77-962C-1DE2CC0CC143}"/>
+          </ac:spMkLst>
+        </pc:spChg>
+        <pc:picChg chg="add mod">
+          <ac:chgData name="GIULIANO LATINI" userId="27e3ac559581c63f" providerId="LiveId" clId="{4973F3F1-B909-42E3-B41D-E3B1A4AEB0AD}" dt="2018-09-16T19:26:44.209" v="165" actId="1037"/>
+          <ac:picMkLst>
+            <pc:docMk/>
+            <pc:sldMk cId="267602705" sldId="263"/>
+            <ac:picMk id="3" creationId="{5FB0D1F6-0529-49EB-B15C-E4AC4BA3314B}"/>
+          </ac:picMkLst>
+        </pc:picChg>
+      </pc:sldChg>
+    </pc:docChg>
+  </pc:docChgLst>
+</pc:chgInfo>
+</file>
+
 <file path=ppt/slideLayouts/slideLayout1.xml><?xml version="1.0" encoding="utf-8"?>
 <p:sldLayout xmlns:a="http://schemas.openxmlformats.org/drawingml/2006/main" xmlns:r="http://schemas.openxmlformats.org/officeDocument/2006/relationships" xmlns:p="http://schemas.openxmlformats.org/presentationml/2006/main" preserve="1" userDrawn="1">
   <p:cSld name="Title Slide">
@@ -539,53 +662,6 @@
       </p:pic>
       <p:sp>
         <p:nvSpPr>
-          <p:cNvPr id="20" name="Rectangle 19">
-            <a:extLst>
-              <a:ext uri="{FF2B5EF4-FFF2-40B4-BE49-F238E27FC236}">
-                <a16:creationId xmlns:a16="http://schemas.microsoft.com/office/drawing/2014/main" id="{C0E6A4BB-5B67-4001-9074-E6DCB6D0817D}"/>
-              </a:ext>
-            </a:extLst>
-          </p:cNvPr>
-          <p:cNvSpPr/>
-          <p:nvPr userDrawn="1"/>
-        </p:nvSpPr>
-        <p:spPr>
-          <a:xfrm>
-            <a:off x="822638" y="1690714"/>
-            <a:ext cx="1682219" cy="495108"/>
-          </a:xfrm>
-          <a:prstGeom prst="rect">
-            <a:avLst/>
-          </a:prstGeom>
-          <a:solidFill>
-            <a:schemeClr val="tx1">
-              <a:lumMod val="20000"/>
-              <a:lumOff val="80000"/>
-            </a:schemeClr>
-          </a:solidFill>
-        </p:spPr>
-        <p:txBody>
-          <a:bodyPr wrap="none" lIns="144000" tIns="108000" rIns="144000" bIns="108000">
-            <a:spAutoFit/>
-          </a:bodyPr>
-          <a:lstStyle/>
-          <a:p>
-            <a:r>
-              <a:rPr lang="en-US" dirty="0">
-                <a:solidFill>
-                  <a:schemeClr val="tx1"/>
-                </a:solidFill>
-                <a:latin typeface="Roboto Light" charset="0"/>
-                <a:ea typeface="Roboto Light" charset="0"/>
-                <a:cs typeface="Roboto Light" charset="0"/>
-              </a:rPr>
-              <a:t>ARGOMENTO</a:t>
-            </a:r>
-          </a:p>
-        </p:txBody>
-      </p:sp>
-      <p:sp>
-        <p:nvSpPr>
           <p:cNvPr id="2" name="Title 1">
             <a:extLst>
               <a:ext uri="{FF2B5EF4-FFF2-40B4-BE49-F238E27FC236}">
@@ -1100,7 +1176,7 @@
           <a:p>
             <a:fld id="{0AE94EDD-D22A-4702-AFE1-732A7AD641D0}" type="datetimeFigureOut">
               <a:rPr lang="en-US" smtClean="0"/>
-              <a:t>8/30/2018</a:t>
+              <a:t>9/16/2018</a:t>
             </a:fld>
             <a:endParaRPr lang="en-US"/>
           </a:p>
@@ -8913,7 +8989,7 @@
           <a:p>
             <a:fld id="{0AE94EDD-D22A-4702-AFE1-732A7AD641D0}" type="datetimeFigureOut">
               <a:rPr lang="en-US" smtClean="0"/>
-              <a:t>8/30/2018</a:t>
+              <a:t>9/16/2018</a:t>
             </a:fld>
             <a:endParaRPr lang="en-US"/>
           </a:p>
@@ -10803,11 +10879,30 @@
             <p:ph type="ctrTitle"/>
           </p:nvPr>
         </p:nvSpPr>
-        <p:spPr/>
+        <p:spPr>
+          <a:xfrm>
+            <a:off x="822638" y="2351023"/>
+            <a:ext cx="4641567" cy="1557275"/>
+          </a:xfrm>
+        </p:spPr>
         <p:txBody>
           <a:bodyPr/>
           <a:lstStyle/>
           <a:p>
+            <a:r>
+              <a:rPr lang="en-US" b="1" dirty="0"/>
+              <a:t>The Infrastructure as Code; </a:t>
+            </a:r>
+            <a:br>
+              <a:rPr lang="en-US" b="1" dirty="0"/>
+            </a:br>
+            <a:r>
+              <a:rPr lang="en-US" b="1" dirty="0"/>
+              <a:t>the naked truth</a:t>
+            </a:r>
+            <a:br>
+              <a:rPr lang="en-US" b="1" dirty="0"/>
+            </a:br>
             <a:endParaRPr lang="en-US" dirty="0"/>
           </a:p>
         </p:txBody>
@@ -10833,7 +10928,7 @@
           <a:bodyPr/>
           <a:lstStyle/>
           <a:p>
-            <a:endParaRPr lang="en-US"/>
+            <a:endParaRPr lang="en-US" dirty="0"/>
           </a:p>
         </p:txBody>
       </p:sp>
@@ -10945,7 +11040,11 @@
           </a:bodyPr>
           <a:lstStyle/>
           <a:p>
-            <a:endParaRPr lang="en-US"/>
+            <a:r>
+              <a:rPr lang="en-US" dirty="0" err="1"/>
+              <a:t>giulianolatini</a:t>
+            </a:r>
+            <a:endParaRPr lang="en-US" dirty="0"/>
           </a:p>
         </p:txBody>
       </p:sp>
@@ -10972,7 +11071,15 @@
           </a:bodyPr>
           <a:lstStyle/>
           <a:p>
-            <a:endParaRPr lang="en-US"/>
+            <a:r>
+              <a:rPr lang="en-US" dirty="0"/>
+              <a:t>@</a:t>
+            </a:r>
+            <a:r>
+              <a:rPr lang="en-US" dirty="0" err="1"/>
+              <a:t>giulianolatini</a:t>
+            </a:r>
+            <a:endParaRPr lang="en-US" dirty="0"/>
           </a:p>
         </p:txBody>
       </p:sp>
@@ -10999,7 +11106,11 @@
           </a:bodyPr>
           <a:lstStyle/>
           <a:p>
-            <a:endParaRPr lang="en-US"/>
+            <a:r>
+              <a:rPr lang="en-US" dirty="0" err="1"/>
+              <a:t>giulianolatini</a:t>
+            </a:r>
+            <a:endParaRPr lang="en-US" dirty="0"/>
           </a:p>
         </p:txBody>
       </p:sp>
@@ -11064,6 +11175,17 @@
             </a:r>
             <a:endParaRPr lang="en-US" dirty="0"/>
           </a:p>
+          <a:p>
+            <a:r>
+              <a:rPr lang="en-US" sz="3200" dirty="0"/>
+              <a:t>#</a:t>
+            </a:r>
+            <a:r>
+              <a:rPr lang="en-US" sz="3200" dirty="0" err="1"/>
+              <a:t>dotnetconf</a:t>
+            </a:r>
+            <a:endParaRPr lang="en-US" sz="3200" dirty="0"/>
+          </a:p>
         </p:txBody>
       </p:sp>
     </p:spTree>
@@ -11143,6 +11265,60 @@
           </a:extLst>
         </p:spPr>
       </p:pic>
+      <p:sp>
+        <p:nvSpPr>
+          <p:cNvPr id="4" name="Title 6">
+            <a:extLst>
+              <a:ext uri="{FF2B5EF4-FFF2-40B4-BE49-F238E27FC236}">
+                <a16:creationId xmlns:a16="http://schemas.microsoft.com/office/drawing/2014/main" id="{770624E2-80CE-4DA7-81E3-04B238B94B22}"/>
+              </a:ext>
+            </a:extLst>
+          </p:cNvPr>
+          <p:cNvSpPr txBox="1">
+            <a:spLocks/>
+          </p:cNvSpPr>
+          <p:nvPr/>
+        </p:nvSpPr>
+        <p:spPr>
+          <a:xfrm>
+            <a:off x="235119" y="176849"/>
+            <a:ext cx="11028485" cy="626517"/>
+          </a:xfrm>
+          <a:prstGeom prst="rect">
+            <a:avLst/>
+          </a:prstGeom>
+        </p:spPr>
+        <p:txBody>
+          <a:bodyPr vert="horz" lIns="91440" tIns="45720" rIns="91440" bIns="45720" rtlCol="0" anchor="ctr">
+            <a:noAutofit/>
+          </a:bodyPr>
+          <a:lstStyle>
+            <a:lvl1pPr algn="l" defTabSz="914400" rtl="0" eaLnBrk="1" latinLnBrk="0" hangingPunct="1">
+              <a:lnSpc>
+                <a:spcPct val="90000"/>
+              </a:lnSpc>
+              <a:spcBef>
+                <a:spcPct val="0"/>
+              </a:spcBef>
+              <a:buNone/>
+              <a:defRPr sz="3000" kern="1200">
+                <a:solidFill>
+                  <a:schemeClr val="bg1"/>
+                </a:solidFill>
+                <a:latin typeface="Myanmar Text" panose="020B0502040204020203" pitchFamily="34" charset="0"/>
+                <a:ea typeface="+mj-ea"/>
+                <a:cs typeface="Myanmar Text" panose="020B0502040204020203" pitchFamily="34" charset="0"/>
+              </a:defRPr>
+            </a:lvl1pPr>
+          </a:lstStyle>
+          <a:p>
+            <a:r>
+              <a:rPr lang="en-US" dirty="0"/>
+              <a:t>Main sponsor</a:t>
+            </a:r>
+          </a:p>
+        </p:txBody>
+      </p:sp>
     </p:spTree>
     <p:extLst>
       <p:ext uri="{BB962C8B-B14F-4D97-AF65-F5344CB8AC3E}">
@@ -11201,7 +11377,7 @@
         </p:blipFill>
         <p:spPr>
           <a:xfrm>
-            <a:off x="5172269" y="1323698"/>
+            <a:off x="3205542" y="870626"/>
             <a:ext cx="6307494" cy="2018398"/>
           </a:xfrm>
           <a:prstGeom prst="rect">
@@ -11237,8 +11413,8 @@
         </p:blipFill>
         <p:spPr>
           <a:xfrm>
-            <a:off x="8326016" y="3229946"/>
-            <a:ext cx="3007774" cy="3260427"/>
+            <a:off x="8693274" y="3628055"/>
+            <a:ext cx="2640515" cy="2862318"/>
           </a:xfrm>
           <a:prstGeom prst="rect">
             <a:avLst/>
@@ -11274,7 +11450,7 @@
         </p:blipFill>
         <p:spPr bwMode="auto">
           <a:xfrm>
-            <a:off x="712237" y="1522444"/>
+            <a:off x="143070" y="2179474"/>
             <a:ext cx="3641508" cy="1314061"/>
           </a:xfrm>
           <a:prstGeom prst="rect">
@@ -11367,14 +11543,103 @@
         </p:blipFill>
         <p:spPr>
           <a:xfrm>
-            <a:off x="4538535" y="2836505"/>
-            <a:ext cx="3641508" cy="4115038"/>
+            <a:off x="4859288" y="3493535"/>
+            <a:ext cx="3127830" cy="3534563"/>
           </a:xfrm>
           <a:prstGeom prst="rect">
             <a:avLst/>
           </a:prstGeom>
         </p:spPr>
       </p:pic>
+      <p:pic>
+        <p:nvPicPr>
+          <p:cNvPr id="3" name="Picture 2">
+            <a:extLst>
+              <a:ext uri="{FF2B5EF4-FFF2-40B4-BE49-F238E27FC236}">
+                <a16:creationId xmlns:a16="http://schemas.microsoft.com/office/drawing/2014/main" id="{CCFA9B2D-8948-44DB-BAB9-6D7B7BE1D986}"/>
+              </a:ext>
+            </a:extLst>
+          </p:cNvPr>
+          <p:cNvPicPr>
+            <a:picLocks noChangeAspect="1"/>
+          </p:cNvPicPr>
+          <p:nvPr/>
+        </p:nvPicPr>
+        <p:blipFill rotWithShape="1">
+          <a:blip r:embed="rId7">
+            <a:extLst>
+              <a:ext uri="{28A0092B-C50C-407E-A947-70E740481C1C}">
+                <a14:useLocalDpi xmlns:a14="http://schemas.microsoft.com/office/drawing/2010/main" val="0"/>
+              </a:ext>
+            </a:extLst>
+          </a:blip>
+          <a:srcRect l="10776" t="16515" r="18526" b="23785"/>
+          <a:stretch/>
+        </p:blipFill>
+        <p:spPr>
+          <a:xfrm>
+            <a:off x="6423203" y="2444620"/>
+            <a:ext cx="5583139" cy="1048915"/>
+          </a:xfrm>
+          <a:prstGeom prst="rect">
+            <a:avLst/>
+          </a:prstGeom>
+        </p:spPr>
+      </p:pic>
+      <p:sp>
+        <p:nvSpPr>
+          <p:cNvPr id="9" name="Title 6">
+            <a:extLst>
+              <a:ext uri="{FF2B5EF4-FFF2-40B4-BE49-F238E27FC236}">
+                <a16:creationId xmlns:a16="http://schemas.microsoft.com/office/drawing/2014/main" id="{4AFDA962-7AFC-4DFC-BC19-7BACF3A384AF}"/>
+              </a:ext>
+            </a:extLst>
+          </p:cNvPr>
+          <p:cNvSpPr txBox="1">
+            <a:spLocks/>
+          </p:cNvSpPr>
+          <p:nvPr/>
+        </p:nvSpPr>
+        <p:spPr>
+          <a:xfrm>
+            <a:off x="235119" y="176849"/>
+            <a:ext cx="11028485" cy="626517"/>
+          </a:xfrm>
+          <a:prstGeom prst="rect">
+            <a:avLst/>
+          </a:prstGeom>
+        </p:spPr>
+        <p:txBody>
+          <a:bodyPr vert="horz" lIns="91440" tIns="45720" rIns="91440" bIns="45720" rtlCol="0" anchor="ctr">
+            <a:noAutofit/>
+          </a:bodyPr>
+          <a:lstStyle>
+            <a:lvl1pPr algn="l" defTabSz="914400" rtl="0" eaLnBrk="1" latinLnBrk="0" hangingPunct="1">
+              <a:lnSpc>
+                <a:spcPct val="90000"/>
+              </a:lnSpc>
+              <a:spcBef>
+                <a:spcPct val="0"/>
+              </a:spcBef>
+              <a:buNone/>
+              <a:defRPr sz="3000" kern="1200">
+                <a:solidFill>
+                  <a:schemeClr val="bg1"/>
+                </a:solidFill>
+                <a:latin typeface="Myanmar Text" panose="020B0502040204020203" pitchFamily="34" charset="0"/>
+                <a:ea typeface="+mj-ea"/>
+                <a:cs typeface="Myanmar Text" panose="020B0502040204020203" pitchFamily="34" charset="0"/>
+              </a:defRPr>
+            </a:lvl1pPr>
+          </a:lstStyle>
+          <a:p>
+            <a:r>
+              <a:rPr lang="en-US" dirty="0"/>
+              <a:t>Community sponsors</a:t>
+            </a:r>
+          </a:p>
+        </p:txBody>
+      </p:sp>
     </p:spTree>
     <p:extLst>
       <p:ext uri="{BB962C8B-B14F-4D97-AF65-F5344CB8AC3E}">
@@ -11460,6 +11725,67 @@
           </a:extLst>
         </p:spPr>
       </p:pic>
+      <p:sp>
+        <p:nvSpPr>
+          <p:cNvPr id="2" name="Rectangle: Rounded Corners 1">
+            <a:extLst>
+              <a:ext uri="{FF2B5EF4-FFF2-40B4-BE49-F238E27FC236}">
+                <a16:creationId xmlns:a16="http://schemas.microsoft.com/office/drawing/2014/main" id="{4D07813C-F964-49F1-AFC1-ECE95E987EF3}"/>
+              </a:ext>
+            </a:extLst>
+          </p:cNvPr>
+          <p:cNvSpPr/>
+          <p:nvPr/>
+        </p:nvSpPr>
+        <p:spPr>
+          <a:xfrm rot="20259998">
+            <a:off x="200054" y="534665"/>
+            <a:ext cx="1987365" cy="541312"/>
+          </a:xfrm>
+          <a:prstGeom prst="roundRect">
+            <a:avLst>
+              <a:gd name="adj" fmla="val 42455"/>
+            </a:avLst>
+          </a:prstGeom>
+          <a:solidFill>
+            <a:srgbClr val="E2068C"/>
+          </a:solidFill>
+        </p:spPr>
+        <p:style>
+          <a:lnRef idx="2">
+            <a:schemeClr val="accent5">
+              <a:shade val="50000"/>
+            </a:schemeClr>
+          </a:lnRef>
+          <a:fillRef idx="1">
+            <a:schemeClr val="accent5"/>
+          </a:fillRef>
+          <a:effectRef idx="0">
+            <a:schemeClr val="accent5"/>
+          </a:effectRef>
+          <a:fontRef idx="minor">
+            <a:schemeClr val="lt1"/>
+          </a:fontRef>
+        </p:style>
+        <p:txBody>
+          <a:bodyPr rtlCol="0" anchor="ctr"/>
+          <a:lstStyle/>
+          <a:p>
+            <a:pPr algn="ctr">
+              <a:lnSpc>
+                <a:spcPct val="150000"/>
+              </a:lnSpc>
+            </a:pPr>
+            <a:r>
+              <a:rPr lang="en-US" sz="2400" dirty="0">
+                <a:latin typeface="Myanmar Text" panose="020B0502040204020203" pitchFamily="34" charset="0"/>
+                <a:cs typeface="Myanmar Text" panose="020B0502040204020203" pitchFamily="34" charset="0"/>
+              </a:rPr>
+              <a:t>Local Event</a:t>
+            </a:r>
+          </a:p>
+        </p:txBody>
+      </p:sp>
     </p:spTree>
     <p:extLst>
       <p:ext uri="{BB962C8B-B14F-4D97-AF65-F5344CB8AC3E}">
@@ -11511,7 +11837,10 @@
           <a:bodyPr/>
           <a:lstStyle/>
           <a:p>
-            <a:endParaRPr lang="en-US"/>
+            <a:r>
+              <a:rPr lang="en-US" b="1" dirty="0"/>
+              <a:t>The Infrastructure as Code; the naked truth</a:t>
+            </a:r>
           </a:p>
         </p:txBody>
       </p:sp>
@@ -11538,7 +11867,15 @@
           </a:bodyPr>
           <a:lstStyle/>
           <a:p>
-            <a:endParaRPr lang="en-US"/>
+            <a:r>
+              <a:rPr lang="en-US" dirty="0"/>
+              <a:t>@</a:t>
+            </a:r>
+            <a:r>
+              <a:rPr lang="en-US" dirty="0" err="1"/>
+              <a:t>giulianolatini</a:t>
+            </a:r>
+            <a:endParaRPr lang="en-US" dirty="0"/>
           </a:p>
         </p:txBody>
       </p:sp>
@@ -11565,7 +11902,11 @@
           </a:bodyPr>
           <a:lstStyle/>
           <a:p>
-            <a:endParaRPr lang="en-US"/>
+            <a:r>
+              <a:rPr lang="en-US" dirty="0" err="1"/>
+              <a:t>giulianolatini</a:t>
+            </a:r>
+            <a:endParaRPr lang="en-US" dirty="0"/>
           </a:p>
         </p:txBody>
       </p:sp>
@@ -11592,7 +11933,11 @@
           </a:bodyPr>
           <a:lstStyle/>
           <a:p>
-            <a:endParaRPr lang="en-US"/>
+            <a:r>
+              <a:rPr lang="en-US" dirty="0" err="1"/>
+              <a:t>giulianolatini</a:t>
+            </a:r>
+            <a:endParaRPr lang="en-US" dirty="0"/>
           </a:p>
         </p:txBody>
       </p:sp>
@@ -11617,10 +11962,49 @@
           <a:bodyPr/>
           <a:lstStyle/>
           <a:p>
-            <a:endParaRPr lang="en-US"/>
+            <a:r>
+              <a:rPr lang="en-US" dirty="0"/>
+              <a:t>GIULIANO LATINI</a:t>
+            </a:r>
           </a:p>
         </p:txBody>
       </p:sp>
+      <p:pic>
+        <p:nvPicPr>
+          <p:cNvPr id="3" name="Immagine 2">
+            <a:extLst>
+              <a:ext uri="{FF2B5EF4-FFF2-40B4-BE49-F238E27FC236}">
+                <a16:creationId xmlns:a16="http://schemas.microsoft.com/office/drawing/2014/main" id="{5FB0D1F6-0529-49EB-B15C-E4AC4BA3314B}"/>
+              </a:ext>
+            </a:extLst>
+          </p:cNvPr>
+          <p:cNvPicPr>
+            <a:picLocks noChangeAspect="1"/>
+          </p:cNvPicPr>
+          <p:nvPr/>
+        </p:nvPicPr>
+        <p:blipFill>
+          <a:blip r:embed="rId2">
+            <a:extLst>
+              <a:ext uri="{28A0092B-C50C-407E-A947-70E740481C1C}">
+                <a14:useLocalDpi xmlns:a14="http://schemas.microsoft.com/office/drawing/2010/main" val="0"/>
+              </a:ext>
+            </a:extLst>
+          </a:blip>
+          <a:stretch>
+            <a:fillRect/>
+          </a:stretch>
+        </p:blipFill>
+        <p:spPr>
+          <a:xfrm>
+            <a:off x="830615" y="2445346"/>
+            <a:ext cx="2707135" cy="2707135"/>
+          </a:xfrm>
+          <a:prstGeom prst="rect">
+            <a:avLst/>
+          </a:prstGeom>
+        </p:spPr>
+      </p:pic>
     </p:spTree>
     <p:extLst>
       <p:ext uri="{BB962C8B-B14F-4D97-AF65-F5344CB8AC3E}">
@@ -11667,12 +12051,17 @@
             <p:ph type="title"/>
           </p:nvPr>
         </p:nvSpPr>
-        <p:spPr/>
+        <p:spPr>
+          <a:xfrm>
+            <a:off x="325315" y="136525"/>
+            <a:ext cx="11028485" cy="626517"/>
+          </a:xfrm>
+        </p:spPr>
         <p:txBody>
           <a:bodyPr/>
           <a:lstStyle/>
           <a:p>
-            <a:endParaRPr lang="en-US"/>
+            <a:endParaRPr lang="en-US" dirty="0"/>
           </a:p>
         </p:txBody>
       </p:sp>

</xml_diff>